<commit_message>
Versione finale da commentare e pulire
</commit_message>
<xml_diff>
--- a/User-System_Interacion.pptx
+++ b/User-System_Interacion.pptx
@@ -5,13 +5,14 @@
     <p:sldMasterId id="2147483648" r:id="rId1"/>
   </p:sldMasterIdLst>
   <p:notesMasterIdLst>
-    <p:notesMasterId r:id="rId6"/>
+    <p:notesMasterId r:id="rId7"/>
   </p:notesMasterIdLst>
   <p:sldIdLst>
     <p:sldId id="256" r:id="rId2"/>
     <p:sldId id="257" r:id="rId3"/>
     <p:sldId id="287" r:id="rId4"/>
     <p:sldId id="286" r:id="rId5"/>
+    <p:sldId id="288" r:id="rId6"/>
   </p:sldIdLst>
   <p:sldSz cx="12192000" cy="6858000"/>
   <p:notesSz cx="6858000" cy="9144000"/>
@@ -200,7 +201,7 @@
           <a:p>
             <a:fld id="{0C081E8C-B050-4DBE-B550-E85D9511E8D8}" type="datetimeFigureOut">
               <a:rPr lang="it-IT" smtClean="0"/>
-              <a:t>02/05/2024</a:t>
+              <a:t>17/05/2024</a:t>
             </a:fld>
             <a:endParaRPr lang="it-IT"/>
           </a:p>
@@ -635,6 +636,174 @@
 </p:notes>
 </file>
 
+<file path=ppt/notesSlides/notesSlide2.xml><?xml version="1.0" encoding="utf-8"?>
+<p:notes xmlns:a="http://schemas.openxmlformats.org/drawingml/2006/main" xmlns:r="http://schemas.openxmlformats.org/officeDocument/2006/relationships" xmlns:p="http://schemas.openxmlformats.org/presentationml/2006/main" showMasterSp="0" showMasterPhAnim="0">
+  <p:cSld>
+    <p:spTree>
+      <p:nvGrpSpPr>
+        <p:cNvPr id="1" name="Shape 167"/>
+        <p:cNvGrpSpPr/>
+        <p:nvPr/>
+      </p:nvGrpSpPr>
+      <p:grpSpPr>
+        <a:xfrm>
+          <a:off x="0" y="0"/>
+          <a:ext cx="0" cy="0"/>
+          <a:chOff x="0" y="0"/>
+          <a:chExt cx="0" cy="0"/>
+        </a:xfrm>
+      </p:grpSpPr>
+      <p:sp>
+        <p:nvSpPr>
+          <p:cNvPr id="168" name="Google Shape;168;g9cecae0499_0_55:notes"/>
+          <p:cNvSpPr>
+            <a:spLocks noGrp="1" noRot="1" noChangeAspect="1"/>
+          </p:cNvSpPr>
+          <p:nvPr>
+            <p:ph type="sldImg" idx="2"/>
+          </p:nvPr>
+        </p:nvSpPr>
+        <p:spPr>
+          <a:xfrm>
+            <a:off x="219075" y="812800"/>
+            <a:ext cx="7115175" cy="4003675"/>
+          </a:xfrm>
+          <a:custGeom>
+            <a:avLst/>
+            <a:gdLst/>
+            <a:ahLst/>
+            <a:cxnLst/>
+            <a:rect l="l" t="t" r="r" b="b"/>
+            <a:pathLst>
+              <a:path w="120000" h="120000" extrusionOk="0">
+                <a:moveTo>
+                  <a:pt x="0" y="0"/>
+                </a:moveTo>
+                <a:lnTo>
+                  <a:pt x="120000" y="0"/>
+                </a:lnTo>
+                <a:lnTo>
+                  <a:pt x="120000" y="120000"/>
+                </a:lnTo>
+                <a:lnTo>
+                  <a:pt x="0" y="120000"/>
+                </a:lnTo>
+                <a:close/>
+              </a:path>
+            </a:pathLst>
+          </a:custGeom>
+          <a:noFill/>
+          <a:ln w="9525" cap="flat" cmpd="sng">
+            <a:solidFill>
+              <a:srgbClr val="000000"/>
+            </a:solidFill>
+            <a:prstDash val="solid"/>
+            <a:miter lim="8000"/>
+            <a:headEnd type="none" w="sm" len="sm"/>
+            <a:tailEnd type="none" w="sm" len="sm"/>
+          </a:ln>
+        </p:spPr>
+      </p:sp>
+      <p:sp>
+        <p:nvSpPr>
+          <p:cNvPr id="169" name="Google Shape;169;g9cecae0499_0_55:notes"/>
+          <p:cNvSpPr/>
+          <p:nvPr/>
+        </p:nvSpPr>
+        <p:spPr>
+          <a:xfrm>
+            <a:off x="755650" y="5078412"/>
+            <a:ext cx="6043500" cy="4806900"/>
+          </a:xfrm>
+          <a:prstGeom prst="rect">
+            <a:avLst/>
+          </a:prstGeom>
+          <a:noFill/>
+          <a:ln>
+            <a:noFill/>
+          </a:ln>
+        </p:spPr>
+        <p:txBody>
+          <a:bodyPr spcFirstLastPara="1" wrap="square" lIns="91425" tIns="45700" rIns="91425" bIns="45700" anchor="ctr" anchorCtr="0">
+            <a:noAutofit/>
+          </a:bodyPr>
+          <a:lstStyle/>
+          <a:p>
+            <a:pPr marL="0" marR="0" lvl="0" indent="0" algn="l" rtl="0">
+              <a:lnSpc>
+                <a:spcPct val="93000"/>
+              </a:lnSpc>
+              <a:spcBef>
+                <a:spcPts val="0"/>
+              </a:spcBef>
+              <a:spcAft>
+                <a:spcPts val="0"/>
+              </a:spcAft>
+              <a:buNone/>
+            </a:pPr>
+            <a:endParaRPr sz="1800" b="0" i="0" u="none" strike="noStrike" cap="none">
+              <a:solidFill>
+                <a:srgbClr val="000000"/>
+              </a:solidFill>
+              <a:latin typeface="Arial"/>
+              <a:ea typeface="Arial"/>
+              <a:cs typeface="Arial"/>
+              <a:sym typeface="Arial"/>
+            </a:endParaRPr>
+          </a:p>
+        </p:txBody>
+      </p:sp>
+      <p:sp>
+        <p:nvSpPr>
+          <p:cNvPr id="170" name="Google Shape;170;g9cecae0499_0_55:notes"/>
+          <p:cNvSpPr txBox="1">
+            <a:spLocks noGrp="1"/>
+          </p:cNvSpPr>
+          <p:nvPr>
+            <p:ph type="body" idx="1"/>
+          </p:nvPr>
+        </p:nvSpPr>
+        <p:spPr>
+          <a:xfrm>
+            <a:off x="720725" y="4679950"/>
+            <a:ext cx="6116700" cy="5037000"/>
+          </a:xfrm>
+          <a:prstGeom prst="rect">
+            <a:avLst/>
+          </a:prstGeom>
+        </p:spPr>
+        <p:txBody>
+          <a:bodyPr spcFirstLastPara="1" wrap="square" lIns="91425" tIns="91425" rIns="91425" bIns="91425" anchor="ctr" anchorCtr="0">
+            <a:noAutofit/>
+          </a:bodyPr>
+          <a:lstStyle/>
+          <a:p>
+            <a:pPr marL="0" lvl="0" indent="0" algn="l" rtl="0">
+              <a:spcBef>
+                <a:spcPts val="0"/>
+              </a:spcBef>
+              <a:spcAft>
+                <a:spcPts val="0"/>
+              </a:spcAft>
+              <a:buNone/>
+            </a:pPr>
+            <a:endParaRPr/>
+          </a:p>
+        </p:txBody>
+      </p:sp>
+    </p:spTree>
+    <p:extLst>
+      <p:ext uri="{BB962C8B-B14F-4D97-AF65-F5344CB8AC3E}">
+        <p14:creationId xmlns:p14="http://schemas.microsoft.com/office/powerpoint/2010/main" val="1664635832"/>
+      </p:ext>
+    </p:extLst>
+  </p:cSld>
+  <p:clrMapOvr>
+    <a:masterClrMapping/>
+  </p:clrMapOvr>
+</p:notes>
+</file>
+
 <file path=ppt/slideLayouts/slideLayout1.xml><?xml version="1.0" encoding="utf-8"?>
 <p:sldLayout xmlns:a="http://schemas.openxmlformats.org/drawingml/2006/main" xmlns:r="http://schemas.openxmlformats.org/officeDocument/2006/relationships" xmlns:p="http://schemas.openxmlformats.org/presentationml/2006/main" type="title" preserve="1">
   <p:cSld name="Diapositiva titolo">
@@ -782,7 +951,7 @@
           <a:p>
             <a:fld id="{8376AB58-4954-4496-9864-14FDFB1C333F}" type="datetimeFigureOut">
               <a:rPr lang="it-IT" smtClean="0"/>
-              <a:t>02/05/2024</a:t>
+              <a:t>17/05/2024</a:t>
             </a:fld>
             <a:endParaRPr lang="it-IT"/>
           </a:p>
@@ -980,7 +1149,7 @@
           <a:p>
             <a:fld id="{8376AB58-4954-4496-9864-14FDFB1C333F}" type="datetimeFigureOut">
               <a:rPr lang="it-IT" smtClean="0"/>
-              <a:t>02/05/2024</a:t>
+              <a:t>17/05/2024</a:t>
             </a:fld>
             <a:endParaRPr lang="it-IT"/>
           </a:p>
@@ -1188,7 +1357,7 @@
           <a:p>
             <a:fld id="{8376AB58-4954-4496-9864-14FDFB1C333F}" type="datetimeFigureOut">
               <a:rPr lang="it-IT" smtClean="0"/>
-              <a:t>02/05/2024</a:t>
+              <a:t>17/05/2024</a:t>
             </a:fld>
             <a:endParaRPr lang="it-IT"/>
           </a:p>
@@ -1386,7 +1555,7 @@
           <a:p>
             <a:fld id="{8376AB58-4954-4496-9864-14FDFB1C333F}" type="datetimeFigureOut">
               <a:rPr lang="it-IT" smtClean="0"/>
-              <a:t>02/05/2024</a:t>
+              <a:t>17/05/2024</a:t>
             </a:fld>
             <a:endParaRPr lang="it-IT"/>
           </a:p>
@@ -1661,7 +1830,7 @@
           <a:p>
             <a:fld id="{8376AB58-4954-4496-9864-14FDFB1C333F}" type="datetimeFigureOut">
               <a:rPr lang="it-IT" smtClean="0"/>
-              <a:t>02/05/2024</a:t>
+              <a:t>17/05/2024</a:t>
             </a:fld>
             <a:endParaRPr lang="it-IT"/>
           </a:p>
@@ -1926,7 +2095,7 @@
           <a:p>
             <a:fld id="{8376AB58-4954-4496-9864-14FDFB1C333F}" type="datetimeFigureOut">
               <a:rPr lang="it-IT" smtClean="0"/>
-              <a:t>02/05/2024</a:t>
+              <a:t>17/05/2024</a:t>
             </a:fld>
             <a:endParaRPr lang="it-IT"/>
           </a:p>
@@ -2338,7 +2507,7 @@
           <a:p>
             <a:fld id="{8376AB58-4954-4496-9864-14FDFB1C333F}" type="datetimeFigureOut">
               <a:rPr lang="it-IT" smtClean="0"/>
-              <a:t>02/05/2024</a:t>
+              <a:t>17/05/2024</a:t>
             </a:fld>
             <a:endParaRPr lang="it-IT"/>
           </a:p>
@@ -2479,7 +2648,7 @@
           <a:p>
             <a:fld id="{8376AB58-4954-4496-9864-14FDFB1C333F}" type="datetimeFigureOut">
               <a:rPr lang="it-IT" smtClean="0"/>
-              <a:t>02/05/2024</a:t>
+              <a:t>17/05/2024</a:t>
             </a:fld>
             <a:endParaRPr lang="it-IT"/>
           </a:p>
@@ -2592,7 +2761,7 @@
           <a:p>
             <a:fld id="{8376AB58-4954-4496-9864-14FDFB1C333F}" type="datetimeFigureOut">
               <a:rPr lang="it-IT" smtClean="0"/>
-              <a:t>02/05/2024</a:t>
+              <a:t>17/05/2024</a:t>
             </a:fld>
             <a:endParaRPr lang="it-IT"/>
           </a:p>
@@ -2903,7 +3072,7 @@
           <a:p>
             <a:fld id="{8376AB58-4954-4496-9864-14FDFB1C333F}" type="datetimeFigureOut">
               <a:rPr lang="it-IT" smtClean="0"/>
-              <a:t>02/05/2024</a:t>
+              <a:t>17/05/2024</a:t>
             </a:fld>
             <a:endParaRPr lang="it-IT"/>
           </a:p>
@@ -3191,7 +3360,7 @@
           <a:p>
             <a:fld id="{8376AB58-4954-4496-9864-14FDFB1C333F}" type="datetimeFigureOut">
               <a:rPr lang="it-IT" smtClean="0"/>
-              <a:t>02/05/2024</a:t>
+              <a:t>17/05/2024</a:t>
             </a:fld>
             <a:endParaRPr lang="it-IT"/>
           </a:p>
@@ -3432,7 +3601,7 @@
           <a:p>
             <a:fld id="{8376AB58-4954-4496-9864-14FDFB1C333F}" type="datetimeFigureOut">
               <a:rPr lang="it-IT" smtClean="0"/>
-              <a:t>02/05/2024</a:t>
+              <a:t>17/05/2024</a:t>
             </a:fld>
             <a:endParaRPr lang="it-IT"/>
           </a:p>
@@ -5504,6 +5673,1208 @@
     <p:extLst>
       <p:ext uri="{BB962C8B-B14F-4D97-AF65-F5344CB8AC3E}">
         <p14:creationId xmlns:p14="http://schemas.microsoft.com/office/powerpoint/2010/main" val="2599113529"/>
+      </p:ext>
+    </p:extLst>
+  </p:cSld>
+  <p:clrMapOvr>
+    <a:masterClrMapping/>
+  </p:clrMapOvr>
+</p:sld>
+</file>
+
+<file path=ppt/slides/slide5.xml><?xml version="1.0" encoding="utf-8"?>
+<p:sld xmlns:a="http://schemas.openxmlformats.org/drawingml/2006/main" xmlns:r="http://schemas.openxmlformats.org/officeDocument/2006/relationships" xmlns:p="http://schemas.openxmlformats.org/presentationml/2006/main">
+  <p:cSld>
+    <p:spTree>
+      <p:nvGrpSpPr>
+        <p:cNvPr id="1" name="Shape 171"/>
+        <p:cNvGrpSpPr/>
+        <p:nvPr/>
+      </p:nvGrpSpPr>
+      <p:grpSpPr>
+        <a:xfrm>
+          <a:off x="0" y="0"/>
+          <a:ext cx="0" cy="0"/>
+          <a:chOff x="0" y="0"/>
+          <a:chExt cx="0" cy="0"/>
+        </a:xfrm>
+      </p:grpSpPr>
+      <p:sp>
+        <p:nvSpPr>
+          <p:cNvPr id="4" name="CasellaDiTesto 3">
+            <a:extLst>
+              <a:ext uri="{FF2B5EF4-FFF2-40B4-BE49-F238E27FC236}">
+                <a16:creationId xmlns:a16="http://schemas.microsoft.com/office/drawing/2014/main" id="{C85CF837-D69B-426B-21EA-2C8AF13C08D0}"/>
+              </a:ext>
+            </a:extLst>
+          </p:cNvPr>
+          <p:cNvSpPr txBox="1"/>
+          <p:nvPr/>
+        </p:nvSpPr>
+        <p:spPr>
+          <a:xfrm>
+            <a:off x="2373502" y="2890350"/>
+            <a:ext cx="1331042" cy="371512"/>
+          </a:xfrm>
+          <a:prstGeom prst="rect">
+            <a:avLst/>
+          </a:prstGeom>
+          <a:noFill/>
+        </p:spPr>
+        <p:txBody>
+          <a:bodyPr wrap="square" rtlCol="0">
+            <a:spAutoFit/>
+          </a:bodyPr>
+          <a:lstStyle/>
+          <a:p>
+            <a:pPr algn="ctr"/>
+            <a:r>
+              <a:rPr lang="it-IT" sz="1814" dirty="0">
+                <a:solidFill>
+                  <a:srgbClr val="B51916"/>
+                </a:solidFill>
+                <a:latin typeface="Fave Script Bold Pro" panose="020B0604020202020204" pitchFamily="2" charset="0"/>
+                <a:ea typeface="STXingkai" panose="020B0503020204020204" pitchFamily="2" charset="-122"/>
+                <a:cs typeface="Dreaming Outloud Script Pro" panose="020B0604020202020204" pitchFamily="66" charset="0"/>
+              </a:rPr>
+              <a:t>HOME PAGE</a:t>
+            </a:r>
+          </a:p>
+        </p:txBody>
+      </p:sp>
+      <p:sp>
+        <p:nvSpPr>
+          <p:cNvPr id="7" name="CasellaDiTesto 6">
+            <a:extLst>
+              <a:ext uri="{FF2B5EF4-FFF2-40B4-BE49-F238E27FC236}">
+                <a16:creationId xmlns:a16="http://schemas.microsoft.com/office/drawing/2014/main" id="{02634147-3624-4D8C-A00D-1654454DD284}"/>
+              </a:ext>
+            </a:extLst>
+          </p:cNvPr>
+          <p:cNvSpPr txBox="1"/>
+          <p:nvPr/>
+        </p:nvSpPr>
+        <p:spPr>
+          <a:xfrm>
+            <a:off x="4920058" y="4796066"/>
+            <a:ext cx="1711900" cy="371512"/>
+          </a:xfrm>
+          <a:prstGeom prst="rect">
+            <a:avLst/>
+          </a:prstGeom>
+          <a:noFill/>
+        </p:spPr>
+        <p:txBody>
+          <a:bodyPr wrap="square" rtlCol="0">
+            <a:spAutoFit/>
+          </a:bodyPr>
+          <a:lstStyle/>
+          <a:p>
+            <a:pPr algn="ctr"/>
+            <a:r>
+              <a:rPr lang="it-IT" sz="1814" dirty="0">
+                <a:solidFill>
+                  <a:srgbClr val="B51916"/>
+                </a:solidFill>
+                <a:latin typeface="Fave Script Bold Pro" panose="020B0604020202020204" pitchFamily="2" charset="0"/>
+                <a:ea typeface="STXingkai" panose="020B0503020204020204" pitchFamily="2" charset="-122"/>
+                <a:cs typeface="Calibri" panose="020F0502020204030204" pitchFamily="34" charset="0"/>
+              </a:rPr>
+              <a:t>ANNUNCI DI VENDITA</a:t>
+            </a:r>
+          </a:p>
+        </p:txBody>
+      </p:sp>
+      <p:cxnSp>
+        <p:nvCxnSpPr>
+          <p:cNvPr id="21" name="Connettore curvo 20">
+            <a:extLst>
+              <a:ext uri="{FF2B5EF4-FFF2-40B4-BE49-F238E27FC236}">
+                <a16:creationId xmlns:a16="http://schemas.microsoft.com/office/drawing/2014/main" id="{D9CE0D5E-F193-515C-9059-EFAF6AE1EBB1}"/>
+              </a:ext>
+            </a:extLst>
+          </p:cNvPr>
+          <p:cNvCxnSpPr>
+            <a:cxnSpLocks/>
+          </p:cNvCxnSpPr>
+          <p:nvPr/>
+        </p:nvCxnSpPr>
+        <p:spPr>
+          <a:xfrm flipV="1">
+            <a:off x="3595292" y="2438870"/>
+            <a:ext cx="914135" cy="796710"/>
+          </a:xfrm>
+          <a:prstGeom prst="curvedConnector3">
+            <a:avLst>
+              <a:gd name="adj1" fmla="val -412"/>
+            </a:avLst>
+          </a:prstGeom>
+          <a:ln w="31750">
+            <a:solidFill>
+              <a:srgbClr val="B51916"/>
+            </a:solidFill>
+            <a:tailEnd type="triangle"/>
+          </a:ln>
+        </p:spPr>
+        <p:style>
+          <a:lnRef idx="1">
+            <a:schemeClr val="accent1"/>
+          </a:lnRef>
+          <a:fillRef idx="0">
+            <a:schemeClr val="accent1"/>
+          </a:fillRef>
+          <a:effectRef idx="0">
+            <a:schemeClr val="accent1"/>
+          </a:effectRef>
+          <a:fontRef idx="minor">
+            <a:schemeClr val="tx1"/>
+          </a:fontRef>
+        </p:style>
+      </p:cxnSp>
+      <p:cxnSp>
+        <p:nvCxnSpPr>
+          <p:cNvPr id="27" name="Connettore curvo 26">
+            <a:extLst>
+              <a:ext uri="{FF2B5EF4-FFF2-40B4-BE49-F238E27FC236}">
+                <a16:creationId xmlns:a16="http://schemas.microsoft.com/office/drawing/2014/main" id="{39E654FF-D571-3442-F73D-B237E44C5FE1}"/>
+              </a:ext>
+            </a:extLst>
+          </p:cNvPr>
+          <p:cNvCxnSpPr>
+            <a:cxnSpLocks/>
+            <a:endCxn id="35" idx="1"/>
+          </p:cNvCxnSpPr>
+          <p:nvPr/>
+        </p:nvCxnSpPr>
+        <p:spPr>
+          <a:xfrm flipV="1">
+            <a:off x="6601955" y="1987992"/>
+            <a:ext cx="561854" cy="493793"/>
+          </a:xfrm>
+          <a:prstGeom prst="curvedConnector3">
+            <a:avLst>
+              <a:gd name="adj1" fmla="val 50000"/>
+            </a:avLst>
+          </a:prstGeom>
+          <a:ln w="31750">
+            <a:solidFill>
+              <a:srgbClr val="B51916"/>
+            </a:solidFill>
+            <a:tailEnd type="triangle"/>
+          </a:ln>
+        </p:spPr>
+        <p:style>
+          <a:lnRef idx="1">
+            <a:schemeClr val="accent1"/>
+          </a:lnRef>
+          <a:fillRef idx="0">
+            <a:schemeClr val="accent1"/>
+          </a:fillRef>
+          <a:effectRef idx="0">
+            <a:schemeClr val="accent1"/>
+          </a:effectRef>
+          <a:fontRef idx="minor">
+            <a:schemeClr val="tx1"/>
+          </a:fontRef>
+        </p:style>
+      </p:cxnSp>
+      <p:sp>
+        <p:nvSpPr>
+          <p:cNvPr id="29" name="CasellaDiTesto 28">
+            <a:extLst>
+              <a:ext uri="{FF2B5EF4-FFF2-40B4-BE49-F238E27FC236}">
+                <a16:creationId xmlns:a16="http://schemas.microsoft.com/office/drawing/2014/main" id="{1E55F394-255B-4208-42D3-764926568970}"/>
+              </a:ext>
+            </a:extLst>
+          </p:cNvPr>
+          <p:cNvSpPr txBox="1"/>
+          <p:nvPr/>
+        </p:nvSpPr>
+        <p:spPr>
+          <a:xfrm>
+            <a:off x="7003948" y="829534"/>
+            <a:ext cx="2032949" cy="371512"/>
+          </a:xfrm>
+          <a:prstGeom prst="rect">
+            <a:avLst/>
+          </a:prstGeom>
+          <a:noFill/>
+        </p:spPr>
+        <p:txBody>
+          <a:bodyPr wrap="square" rtlCol="0">
+            <a:spAutoFit/>
+          </a:bodyPr>
+          <a:lstStyle/>
+          <a:p>
+            <a:pPr lvl="1" algn="ctr"/>
+            <a:r>
+              <a:rPr lang="it-IT" sz="1814" dirty="0">
+                <a:solidFill>
+                  <a:srgbClr val="B51916"/>
+                </a:solidFill>
+                <a:latin typeface="Fave Script Bold Pro" panose="020B0604020202020204" pitchFamily="2" charset="0"/>
+                <a:ea typeface="STXingkai" panose="020B0503020204020204" pitchFamily="2" charset="-122"/>
+                <a:cs typeface="Calibri" panose="020F0502020204030204" pitchFamily="34" charset="0"/>
+              </a:rPr>
+              <a:t>DETTAGLIO RAZZA</a:t>
+            </a:r>
+          </a:p>
+        </p:txBody>
+      </p:sp>
+      <p:cxnSp>
+        <p:nvCxnSpPr>
+          <p:cNvPr id="41" name="Connettore curvo 40">
+            <a:extLst>
+              <a:ext uri="{FF2B5EF4-FFF2-40B4-BE49-F238E27FC236}">
+                <a16:creationId xmlns:a16="http://schemas.microsoft.com/office/drawing/2014/main" id="{ABEA8235-47F4-EA89-6B60-31A54DBC1D76}"/>
+              </a:ext>
+            </a:extLst>
+          </p:cNvPr>
+          <p:cNvCxnSpPr>
+            <a:cxnSpLocks/>
+          </p:cNvCxnSpPr>
+          <p:nvPr/>
+        </p:nvCxnSpPr>
+        <p:spPr>
+          <a:xfrm rot="5400000" flipH="1" flipV="1">
+            <a:off x="6149663" y="3305105"/>
+            <a:ext cx="2321257" cy="1339068"/>
+          </a:xfrm>
+          <a:prstGeom prst="curvedConnector3">
+            <a:avLst>
+              <a:gd name="adj1" fmla="val 50000"/>
+            </a:avLst>
+          </a:prstGeom>
+          <a:ln w="31750">
+            <a:solidFill>
+              <a:srgbClr val="B51916"/>
+            </a:solidFill>
+            <a:tailEnd type="triangle"/>
+          </a:ln>
+        </p:spPr>
+        <p:style>
+          <a:lnRef idx="1">
+            <a:schemeClr val="accent1"/>
+          </a:lnRef>
+          <a:fillRef idx="0">
+            <a:schemeClr val="accent1"/>
+          </a:fillRef>
+          <a:effectRef idx="0">
+            <a:schemeClr val="accent1"/>
+          </a:effectRef>
+          <a:fontRef idx="minor">
+            <a:schemeClr val="tx1"/>
+          </a:fontRef>
+        </p:style>
+      </p:cxnSp>
+      <p:sp>
+        <p:nvSpPr>
+          <p:cNvPr id="45" name="CasellaDiTesto 44">
+            <a:extLst>
+              <a:ext uri="{FF2B5EF4-FFF2-40B4-BE49-F238E27FC236}">
+                <a16:creationId xmlns:a16="http://schemas.microsoft.com/office/drawing/2014/main" id="{F751F31D-73BA-9952-F079-8A9BD3C417FA}"/>
+              </a:ext>
+            </a:extLst>
+          </p:cNvPr>
+          <p:cNvSpPr txBox="1"/>
+          <p:nvPr/>
+        </p:nvSpPr>
+        <p:spPr>
+          <a:xfrm>
+            <a:off x="4473928" y="1901577"/>
+            <a:ext cx="2236132" cy="371512"/>
+          </a:xfrm>
+          <a:prstGeom prst="rect">
+            <a:avLst/>
+          </a:prstGeom>
+          <a:noFill/>
+        </p:spPr>
+        <p:txBody>
+          <a:bodyPr wrap="square" rtlCol="0">
+            <a:spAutoFit/>
+          </a:bodyPr>
+          <a:lstStyle/>
+          <a:p>
+            <a:pPr algn="ctr"/>
+            <a:r>
+              <a:rPr lang="it-IT" sz="1814" dirty="0">
+                <a:solidFill>
+                  <a:srgbClr val="B51916"/>
+                </a:solidFill>
+                <a:latin typeface="Fave Script Bold Pro" panose="020B0604020202020204" pitchFamily="2" charset="0"/>
+                <a:ea typeface="STXingkai" panose="020B0503020204020204" pitchFamily="2" charset="-122"/>
+                <a:cs typeface="Calibri" panose="020F0502020204030204" pitchFamily="34" charset="0"/>
+              </a:rPr>
+              <a:t>DIZIONARIO DELLE  RAZZE</a:t>
+            </a:r>
+          </a:p>
+        </p:txBody>
+      </p:sp>
+      <p:cxnSp>
+        <p:nvCxnSpPr>
+          <p:cNvPr id="46" name="Connettore curvo 45">
+            <a:extLst>
+              <a:ext uri="{FF2B5EF4-FFF2-40B4-BE49-F238E27FC236}">
+                <a16:creationId xmlns:a16="http://schemas.microsoft.com/office/drawing/2014/main" id="{2CC6451C-F8F5-1934-5017-2DFAD7391140}"/>
+              </a:ext>
+            </a:extLst>
+          </p:cNvPr>
+          <p:cNvCxnSpPr>
+            <a:cxnSpLocks/>
+            <a:stCxn id="3" idx="2"/>
+          </p:cNvCxnSpPr>
+          <p:nvPr/>
+        </p:nvCxnSpPr>
+        <p:spPr>
+          <a:xfrm rot="16200000" flipH="1">
+            <a:off x="3529784" y="4504411"/>
+            <a:ext cx="886983" cy="1703172"/>
+          </a:xfrm>
+          <a:prstGeom prst="curvedConnector2">
+            <a:avLst/>
+          </a:prstGeom>
+          <a:ln w="31750">
+            <a:solidFill>
+              <a:srgbClr val="B51916"/>
+            </a:solidFill>
+            <a:tailEnd type="triangle"/>
+          </a:ln>
+        </p:spPr>
+        <p:style>
+          <a:lnRef idx="1">
+            <a:schemeClr val="accent1"/>
+          </a:lnRef>
+          <a:fillRef idx="0">
+            <a:schemeClr val="accent1"/>
+          </a:fillRef>
+          <a:effectRef idx="0">
+            <a:schemeClr val="accent1"/>
+          </a:effectRef>
+          <a:fontRef idx="minor">
+            <a:schemeClr val="tx1"/>
+          </a:fontRef>
+        </p:style>
+      </p:cxnSp>
+      <p:cxnSp>
+        <p:nvCxnSpPr>
+          <p:cNvPr id="65" name="Connettore curvo 64">
+            <a:extLst>
+              <a:ext uri="{FF2B5EF4-FFF2-40B4-BE49-F238E27FC236}">
+                <a16:creationId xmlns:a16="http://schemas.microsoft.com/office/drawing/2014/main" id="{0D8FF805-B49C-A70B-0812-CA6AE5EB0ED2}"/>
+              </a:ext>
+            </a:extLst>
+          </p:cNvPr>
+          <p:cNvCxnSpPr>
+            <a:cxnSpLocks/>
+          </p:cNvCxnSpPr>
+          <p:nvPr/>
+        </p:nvCxnSpPr>
+        <p:spPr>
+          <a:xfrm>
+            <a:off x="6487111" y="5465148"/>
+            <a:ext cx="1389355" cy="415819"/>
+          </a:xfrm>
+          <a:prstGeom prst="curvedConnector3">
+            <a:avLst>
+              <a:gd name="adj1" fmla="val 50000"/>
+            </a:avLst>
+          </a:prstGeom>
+          <a:ln w="31750">
+            <a:solidFill>
+              <a:srgbClr val="B51916"/>
+            </a:solidFill>
+            <a:tailEnd type="triangle"/>
+          </a:ln>
+        </p:spPr>
+        <p:style>
+          <a:lnRef idx="1">
+            <a:schemeClr val="accent1"/>
+          </a:lnRef>
+          <a:fillRef idx="0">
+            <a:schemeClr val="accent1"/>
+          </a:fillRef>
+          <a:effectRef idx="0">
+            <a:schemeClr val="accent1"/>
+          </a:effectRef>
+          <a:fontRef idx="minor">
+            <a:schemeClr val="tx1"/>
+          </a:fontRef>
+        </p:style>
+      </p:cxnSp>
+      <p:sp>
+        <p:nvSpPr>
+          <p:cNvPr id="69" name="CasellaDiTesto 68">
+            <a:extLst>
+              <a:ext uri="{FF2B5EF4-FFF2-40B4-BE49-F238E27FC236}">
+                <a16:creationId xmlns:a16="http://schemas.microsoft.com/office/drawing/2014/main" id="{2516EF07-9489-1DB3-3532-8E4C9974BA5E}"/>
+              </a:ext>
+            </a:extLst>
+          </p:cNvPr>
+          <p:cNvSpPr txBox="1"/>
+          <p:nvPr/>
+        </p:nvSpPr>
+        <p:spPr>
+          <a:xfrm>
+            <a:off x="7979826" y="4751375"/>
+            <a:ext cx="1862243" cy="371512"/>
+          </a:xfrm>
+          <a:prstGeom prst="rect">
+            <a:avLst/>
+          </a:prstGeom>
+          <a:noFill/>
+        </p:spPr>
+        <p:txBody>
+          <a:bodyPr wrap="square" rtlCol="0">
+            <a:spAutoFit/>
+          </a:bodyPr>
+          <a:lstStyle/>
+          <a:p>
+            <a:pPr algn="ctr"/>
+            <a:r>
+              <a:rPr lang="it-IT" sz="1814" dirty="0">
+                <a:solidFill>
+                  <a:srgbClr val="B51916"/>
+                </a:solidFill>
+                <a:latin typeface="Fave Script Bold Pro" panose="020B0604020202020204" pitchFamily="2" charset="0"/>
+                <a:ea typeface="STXingkai" panose="020B0503020204020204" pitchFamily="2" charset="-122"/>
+                <a:cs typeface="Calibri" panose="020F0502020204030204" pitchFamily="34" charset="0"/>
+              </a:rPr>
+              <a:t>DETTAGLIO ANNUNCIO</a:t>
+            </a:r>
+          </a:p>
+        </p:txBody>
+      </p:sp>
+      <p:sp>
+        <p:nvSpPr>
+          <p:cNvPr id="8" name="Google Shape;124;p18">
+            <a:extLst>
+              <a:ext uri="{FF2B5EF4-FFF2-40B4-BE49-F238E27FC236}">
+                <a16:creationId xmlns:a16="http://schemas.microsoft.com/office/drawing/2014/main" id="{E73E590A-8834-1541-17E6-D3A66B1EA891}"/>
+              </a:ext>
+            </a:extLst>
+          </p:cNvPr>
+          <p:cNvSpPr txBox="1">
+            <a:spLocks/>
+          </p:cNvSpPr>
+          <p:nvPr/>
+        </p:nvSpPr>
+        <p:spPr>
+          <a:xfrm>
+            <a:off x="157219" y="-17249"/>
+            <a:ext cx="4386501" cy="763628"/>
+          </a:xfrm>
+          <a:prstGeom prst="rect">
+            <a:avLst/>
+          </a:prstGeom>
+          <a:noFill/>
+          <a:ln>
+            <a:noFill/>
+          </a:ln>
+        </p:spPr>
+        <p:txBody>
+          <a:bodyPr spcFirstLastPara="1" wrap="square" lIns="101579" tIns="101579" rIns="101579" bIns="101579" rtlCol="0" anchor="t" anchorCtr="0">
+            <a:spAutoFit/>
+          </a:bodyPr>
+          <a:lstStyle>
+            <a:defPPr marR="0" lvl="0" algn="l" rtl="0">
+              <a:lnSpc>
+                <a:spcPct val="100000"/>
+              </a:lnSpc>
+              <a:spcBef>
+                <a:spcPts val="0"/>
+              </a:spcBef>
+              <a:spcAft>
+                <a:spcPts val="0"/>
+              </a:spcAft>
+              <a:defRPr/>
+            </a:defPPr>
+            <a:lvl1pPr>
+              <a:buSzPts val="3700"/>
+              <a:buNone/>
+              <a:defRPr sz="4000">
+                <a:solidFill>
+                  <a:srgbClr val="AC1915"/>
+                </a:solidFill>
+                <a:latin typeface="Calibri" panose="020F0502020204030204" pitchFamily="34" charset="0"/>
+                <a:ea typeface="Roboto"/>
+                <a:cs typeface="Calibri" panose="020F0502020204030204" pitchFamily="34" charset="0"/>
+              </a:defRPr>
+            </a:lvl1pPr>
+            <a:lvl2pPr>
+              <a:buClr>
+                <a:schemeClr val="dk1"/>
+              </a:buClr>
+              <a:buSzPts val="3700"/>
+              <a:buFont typeface="Roboto"/>
+              <a:buNone/>
+              <a:defRPr sz="3700">
+                <a:solidFill>
+                  <a:schemeClr val="dk1"/>
+                </a:solidFill>
+                <a:latin typeface="Roboto"/>
+                <a:ea typeface="Roboto"/>
+                <a:cs typeface="Roboto"/>
+              </a:defRPr>
+            </a:lvl2pPr>
+            <a:lvl3pPr>
+              <a:buClr>
+                <a:schemeClr val="dk1"/>
+              </a:buClr>
+              <a:buSzPts val="3700"/>
+              <a:buFont typeface="Roboto"/>
+              <a:buNone/>
+              <a:defRPr sz="3700">
+                <a:solidFill>
+                  <a:schemeClr val="dk1"/>
+                </a:solidFill>
+                <a:latin typeface="Roboto"/>
+                <a:ea typeface="Roboto"/>
+                <a:cs typeface="Roboto"/>
+              </a:defRPr>
+            </a:lvl3pPr>
+            <a:lvl4pPr>
+              <a:buClr>
+                <a:schemeClr val="dk1"/>
+              </a:buClr>
+              <a:buSzPts val="3700"/>
+              <a:buFont typeface="Roboto"/>
+              <a:buNone/>
+              <a:defRPr sz="3700">
+                <a:solidFill>
+                  <a:schemeClr val="dk1"/>
+                </a:solidFill>
+                <a:latin typeface="Roboto"/>
+                <a:ea typeface="Roboto"/>
+                <a:cs typeface="Roboto"/>
+              </a:defRPr>
+            </a:lvl4pPr>
+            <a:lvl5pPr>
+              <a:buClr>
+                <a:schemeClr val="dk1"/>
+              </a:buClr>
+              <a:buSzPts val="3700"/>
+              <a:buFont typeface="Roboto"/>
+              <a:buNone/>
+              <a:defRPr sz="3700">
+                <a:solidFill>
+                  <a:schemeClr val="dk1"/>
+                </a:solidFill>
+                <a:latin typeface="Roboto"/>
+                <a:ea typeface="Roboto"/>
+                <a:cs typeface="Roboto"/>
+              </a:defRPr>
+            </a:lvl5pPr>
+            <a:lvl6pPr>
+              <a:buClr>
+                <a:schemeClr val="dk1"/>
+              </a:buClr>
+              <a:buSzPts val="3700"/>
+              <a:buFont typeface="Roboto"/>
+              <a:buNone/>
+              <a:defRPr sz="3700">
+                <a:solidFill>
+                  <a:schemeClr val="dk1"/>
+                </a:solidFill>
+                <a:latin typeface="Roboto"/>
+                <a:ea typeface="Roboto"/>
+                <a:cs typeface="Roboto"/>
+              </a:defRPr>
+            </a:lvl6pPr>
+            <a:lvl7pPr>
+              <a:buClr>
+                <a:schemeClr val="dk1"/>
+              </a:buClr>
+              <a:buSzPts val="3700"/>
+              <a:buFont typeface="Roboto"/>
+              <a:buNone/>
+              <a:defRPr sz="3700">
+                <a:solidFill>
+                  <a:schemeClr val="dk1"/>
+                </a:solidFill>
+                <a:latin typeface="Roboto"/>
+                <a:ea typeface="Roboto"/>
+                <a:cs typeface="Roboto"/>
+              </a:defRPr>
+            </a:lvl7pPr>
+            <a:lvl8pPr>
+              <a:buClr>
+                <a:schemeClr val="dk1"/>
+              </a:buClr>
+              <a:buSzPts val="3700"/>
+              <a:buFont typeface="Roboto"/>
+              <a:buNone/>
+              <a:defRPr sz="3700">
+                <a:solidFill>
+                  <a:schemeClr val="dk1"/>
+                </a:solidFill>
+                <a:latin typeface="Roboto"/>
+                <a:ea typeface="Roboto"/>
+                <a:cs typeface="Roboto"/>
+              </a:defRPr>
+            </a:lvl8pPr>
+            <a:lvl9pPr>
+              <a:buClr>
+                <a:schemeClr val="dk1"/>
+              </a:buClr>
+              <a:buSzPts val="3700"/>
+              <a:buFont typeface="Roboto"/>
+              <a:buNone/>
+              <a:defRPr sz="3700">
+                <a:solidFill>
+                  <a:schemeClr val="dk1"/>
+                </a:solidFill>
+                <a:latin typeface="Roboto"/>
+                <a:ea typeface="Roboto"/>
+                <a:cs typeface="Roboto"/>
+              </a:defRPr>
+            </a:lvl9pPr>
+          </a:lstStyle>
+          <a:p>
+            <a:r>
+              <a:rPr lang="en-US" sz="3629" dirty="0">
+                <a:sym typeface="Nunito"/>
+              </a:rPr>
+              <a:t>User Interaction Draft</a:t>
+            </a:r>
+            <a:endParaRPr lang="en-US" sz="3629" b="1" dirty="0">
+              <a:sym typeface="Nunito"/>
+            </a:endParaRPr>
+          </a:p>
+        </p:txBody>
+      </p:sp>
+      <p:pic>
+        <p:nvPicPr>
+          <p:cNvPr id="3" name="Immagine 2">
+            <a:extLst>
+              <a:ext uri="{FF2B5EF4-FFF2-40B4-BE49-F238E27FC236}">
+                <a16:creationId xmlns:a16="http://schemas.microsoft.com/office/drawing/2014/main" id="{9FA99053-7E28-57C8-39AE-45D17C7899BB}"/>
+              </a:ext>
+            </a:extLst>
+          </p:cNvPr>
+          <p:cNvPicPr>
+            <a:picLocks noChangeAspect="1"/>
+          </p:cNvPicPr>
+          <p:nvPr/>
+        </p:nvPicPr>
+        <p:blipFill>
+          <a:blip r:embed="rId3"/>
+          <a:stretch>
+            <a:fillRect/>
+          </a:stretch>
+        </p:blipFill>
+        <p:spPr>
+          <a:xfrm>
+            <a:off x="2015296" y="3235580"/>
+            <a:ext cx="2212785" cy="1676926"/>
+          </a:xfrm>
+          <a:prstGeom prst="rect">
+            <a:avLst/>
+          </a:prstGeom>
+        </p:spPr>
+      </p:pic>
+      <p:pic>
+        <p:nvPicPr>
+          <p:cNvPr id="24" name="Immagine 23">
+            <a:extLst>
+              <a:ext uri="{FF2B5EF4-FFF2-40B4-BE49-F238E27FC236}">
+                <a16:creationId xmlns:a16="http://schemas.microsoft.com/office/drawing/2014/main" id="{BD2870B0-EAD0-E962-3E07-8E20B492C22B}"/>
+              </a:ext>
+            </a:extLst>
+          </p:cNvPr>
+          <p:cNvPicPr>
+            <a:picLocks noChangeAspect="1"/>
+          </p:cNvPicPr>
+          <p:nvPr/>
+        </p:nvPicPr>
+        <p:blipFill>
+          <a:blip r:embed="rId4"/>
+          <a:stretch>
+            <a:fillRect/>
+          </a:stretch>
+        </p:blipFill>
+        <p:spPr>
+          <a:xfrm>
+            <a:off x="4473928" y="2207321"/>
+            <a:ext cx="2163281" cy="1656262"/>
+          </a:xfrm>
+          <a:prstGeom prst="rect">
+            <a:avLst/>
+          </a:prstGeom>
+        </p:spPr>
+      </p:pic>
+      <p:pic>
+        <p:nvPicPr>
+          <p:cNvPr id="35" name="Immagine 34">
+            <a:extLst>
+              <a:ext uri="{FF2B5EF4-FFF2-40B4-BE49-F238E27FC236}">
+                <a16:creationId xmlns:a16="http://schemas.microsoft.com/office/drawing/2014/main" id="{393383FB-1CA4-B69E-9619-74C9536B74DB}"/>
+              </a:ext>
+            </a:extLst>
+          </p:cNvPr>
+          <p:cNvPicPr>
+            <a:picLocks noChangeAspect="1"/>
+          </p:cNvPicPr>
+          <p:nvPr/>
+        </p:nvPicPr>
+        <p:blipFill>
+          <a:blip r:embed="rId5"/>
+          <a:stretch>
+            <a:fillRect/>
+          </a:stretch>
+        </p:blipFill>
+        <p:spPr>
+          <a:xfrm>
+            <a:off x="7163809" y="1161973"/>
+            <a:ext cx="2163281" cy="1652037"/>
+          </a:xfrm>
+          <a:prstGeom prst="rect">
+            <a:avLst/>
+          </a:prstGeom>
+        </p:spPr>
+      </p:pic>
+      <p:pic>
+        <p:nvPicPr>
+          <p:cNvPr id="44" name="Immagine 43">
+            <a:extLst>
+              <a:ext uri="{FF2B5EF4-FFF2-40B4-BE49-F238E27FC236}">
+                <a16:creationId xmlns:a16="http://schemas.microsoft.com/office/drawing/2014/main" id="{A3D16AD7-89AB-6170-1718-DA09A6DA10D8}"/>
+              </a:ext>
+            </a:extLst>
+          </p:cNvPr>
+          <p:cNvPicPr>
+            <a:picLocks noChangeAspect="1"/>
+          </p:cNvPicPr>
+          <p:nvPr/>
+        </p:nvPicPr>
+        <p:blipFill>
+          <a:blip r:embed="rId6"/>
+          <a:stretch>
+            <a:fillRect/>
+          </a:stretch>
+        </p:blipFill>
+        <p:spPr>
+          <a:xfrm>
+            <a:off x="4833661" y="5122887"/>
+            <a:ext cx="2170287" cy="1674343"/>
+          </a:xfrm>
+          <a:prstGeom prst="rect">
+            <a:avLst/>
+          </a:prstGeom>
+        </p:spPr>
+      </p:pic>
+      <p:pic>
+        <p:nvPicPr>
+          <p:cNvPr id="50" name="Immagine 49">
+            <a:extLst>
+              <a:ext uri="{FF2B5EF4-FFF2-40B4-BE49-F238E27FC236}">
+                <a16:creationId xmlns:a16="http://schemas.microsoft.com/office/drawing/2014/main" id="{9C15C6EA-4163-FA51-1D92-28D19D6CBFC6}"/>
+              </a:ext>
+            </a:extLst>
+          </p:cNvPr>
+          <p:cNvPicPr>
+            <a:picLocks noChangeAspect="1"/>
+          </p:cNvPicPr>
+          <p:nvPr/>
+        </p:nvPicPr>
+        <p:blipFill>
+          <a:blip r:embed="rId7"/>
+          <a:stretch>
+            <a:fillRect/>
+          </a:stretch>
+        </p:blipFill>
+        <p:spPr>
+          <a:xfrm>
+            <a:off x="7885265" y="5122887"/>
+            <a:ext cx="2170287" cy="1663886"/>
+          </a:xfrm>
+          <a:prstGeom prst="rect">
+            <a:avLst/>
+          </a:prstGeom>
+        </p:spPr>
+      </p:pic>
+      <p:pic>
+        <p:nvPicPr>
+          <p:cNvPr id="52" name="Immagine 51">
+            <a:extLst>
+              <a:ext uri="{FF2B5EF4-FFF2-40B4-BE49-F238E27FC236}">
+                <a16:creationId xmlns:a16="http://schemas.microsoft.com/office/drawing/2014/main" id="{48A6E478-7C44-67BB-4D7F-87B7889085F9}"/>
+              </a:ext>
+            </a:extLst>
+          </p:cNvPr>
+          <p:cNvPicPr>
+            <a:picLocks noChangeAspect="1"/>
+          </p:cNvPicPr>
+          <p:nvPr/>
+        </p:nvPicPr>
+        <p:blipFill>
+          <a:blip r:embed="rId8"/>
+          <a:stretch>
+            <a:fillRect/>
+          </a:stretch>
+        </p:blipFill>
+        <p:spPr>
+          <a:xfrm>
+            <a:off x="138317" y="1067445"/>
+            <a:ext cx="2236132" cy="1746565"/>
+          </a:xfrm>
+          <a:prstGeom prst="rect">
+            <a:avLst/>
+          </a:prstGeom>
+        </p:spPr>
+      </p:pic>
+      <p:cxnSp>
+        <p:nvCxnSpPr>
+          <p:cNvPr id="53" name="Connettore curvo 52">
+            <a:extLst>
+              <a:ext uri="{FF2B5EF4-FFF2-40B4-BE49-F238E27FC236}">
+                <a16:creationId xmlns:a16="http://schemas.microsoft.com/office/drawing/2014/main" id="{8AC107EB-F982-D00F-CE92-D024589F4C7D}"/>
+              </a:ext>
+            </a:extLst>
+          </p:cNvPr>
+          <p:cNvCxnSpPr>
+            <a:cxnSpLocks/>
+            <a:stCxn id="3" idx="1"/>
+            <a:endCxn id="52" idx="2"/>
+          </p:cNvCxnSpPr>
+          <p:nvPr/>
+        </p:nvCxnSpPr>
+        <p:spPr>
+          <a:xfrm rot="10800000">
+            <a:off x="1256384" y="2814011"/>
+            <a:ext cx="758913" cy="1260033"/>
+          </a:xfrm>
+          <a:prstGeom prst="curvedConnector2">
+            <a:avLst/>
+          </a:prstGeom>
+          <a:ln w="31750">
+            <a:solidFill>
+              <a:srgbClr val="B51916"/>
+            </a:solidFill>
+            <a:tailEnd type="triangle"/>
+          </a:ln>
+        </p:spPr>
+        <p:style>
+          <a:lnRef idx="1">
+            <a:schemeClr val="accent1"/>
+          </a:lnRef>
+          <a:fillRef idx="0">
+            <a:schemeClr val="accent1"/>
+          </a:fillRef>
+          <a:effectRef idx="0">
+            <a:schemeClr val="accent1"/>
+          </a:effectRef>
+          <a:fontRef idx="minor">
+            <a:schemeClr val="tx1"/>
+          </a:fontRef>
+        </p:style>
+      </p:cxnSp>
+      <p:sp>
+        <p:nvSpPr>
+          <p:cNvPr id="56" name="CasellaDiTesto 55">
+            <a:extLst>
+              <a:ext uri="{FF2B5EF4-FFF2-40B4-BE49-F238E27FC236}">
+                <a16:creationId xmlns:a16="http://schemas.microsoft.com/office/drawing/2014/main" id="{94183B2D-20ED-5B89-55DE-EDC78EF1DD10}"/>
+              </a:ext>
+            </a:extLst>
+          </p:cNvPr>
+          <p:cNvSpPr txBox="1"/>
+          <p:nvPr/>
+        </p:nvSpPr>
+        <p:spPr>
+          <a:xfrm>
+            <a:off x="590862" y="743068"/>
+            <a:ext cx="1331042" cy="371512"/>
+          </a:xfrm>
+          <a:prstGeom prst="rect">
+            <a:avLst/>
+          </a:prstGeom>
+          <a:noFill/>
+        </p:spPr>
+        <p:txBody>
+          <a:bodyPr wrap="square" rtlCol="0">
+            <a:spAutoFit/>
+          </a:bodyPr>
+          <a:lstStyle/>
+          <a:p>
+            <a:pPr algn="ctr"/>
+            <a:r>
+              <a:rPr lang="it-IT" sz="1814" dirty="0">
+                <a:solidFill>
+                  <a:srgbClr val="B51916"/>
+                </a:solidFill>
+                <a:latin typeface="Fave Script Bold Pro" panose="020B0604020202020204" pitchFamily="2" charset="0"/>
+                <a:ea typeface="STXingkai" panose="020B0503020204020204" pitchFamily="2" charset="-122"/>
+                <a:cs typeface="Dreaming Outloud Script Pro" panose="020B0604020202020204" pitchFamily="66" charset="0"/>
+              </a:rPr>
+              <a:t>DOWNLOAD</a:t>
+            </a:r>
+          </a:p>
+        </p:txBody>
+      </p:sp>
+      <p:sp>
+        <p:nvSpPr>
+          <p:cNvPr id="63" name="Rettangolo 62">
+            <a:extLst>
+              <a:ext uri="{FF2B5EF4-FFF2-40B4-BE49-F238E27FC236}">
+                <a16:creationId xmlns:a16="http://schemas.microsoft.com/office/drawing/2014/main" id="{1A3688F8-5F14-5ED2-BEE0-12BEA1A8A719}"/>
+              </a:ext>
+            </a:extLst>
+          </p:cNvPr>
+          <p:cNvSpPr/>
+          <p:nvPr/>
+        </p:nvSpPr>
+        <p:spPr>
+          <a:xfrm>
+            <a:off x="1070610" y="1114580"/>
+            <a:ext cx="346710" cy="86466"/>
+          </a:xfrm>
+          <a:prstGeom prst="rect">
+            <a:avLst/>
+          </a:prstGeom>
+          <a:solidFill>
+            <a:srgbClr val="C1C1C1"/>
+          </a:solidFill>
+          <a:ln>
+            <a:noFill/>
+          </a:ln>
+        </p:spPr>
+        <p:style>
+          <a:lnRef idx="2">
+            <a:schemeClr val="accent1">
+              <a:shade val="15000"/>
+            </a:schemeClr>
+          </a:lnRef>
+          <a:fillRef idx="1">
+            <a:schemeClr val="accent1"/>
+          </a:fillRef>
+          <a:effectRef idx="0">
+            <a:schemeClr val="accent1"/>
+          </a:effectRef>
+          <a:fontRef idx="minor">
+            <a:schemeClr val="lt1"/>
+          </a:fontRef>
+        </p:style>
+        <p:txBody>
+          <a:bodyPr rtlCol="0" anchor="ctr"/>
+          <a:lstStyle/>
+          <a:p>
+            <a:pPr algn="ctr"/>
+            <a:endParaRPr lang="it-IT"/>
+          </a:p>
+        </p:txBody>
+      </p:sp>
+      <p:sp>
+        <p:nvSpPr>
+          <p:cNvPr id="66" name="Rettangolo 65">
+            <a:extLst>
+              <a:ext uri="{FF2B5EF4-FFF2-40B4-BE49-F238E27FC236}">
+                <a16:creationId xmlns:a16="http://schemas.microsoft.com/office/drawing/2014/main" id="{07ACB8B3-C347-D32F-3904-35EA1C924DAD}"/>
+              </a:ext>
+            </a:extLst>
+          </p:cNvPr>
+          <p:cNvSpPr/>
+          <p:nvPr/>
+        </p:nvSpPr>
+        <p:spPr>
+          <a:xfrm>
+            <a:off x="5364587" y="2247738"/>
+            <a:ext cx="346710" cy="86466"/>
+          </a:xfrm>
+          <a:prstGeom prst="rect">
+            <a:avLst/>
+          </a:prstGeom>
+          <a:solidFill>
+            <a:srgbClr val="C1C1C1"/>
+          </a:solidFill>
+          <a:ln>
+            <a:noFill/>
+          </a:ln>
+        </p:spPr>
+        <p:style>
+          <a:lnRef idx="2">
+            <a:schemeClr val="accent1">
+              <a:shade val="15000"/>
+            </a:schemeClr>
+          </a:lnRef>
+          <a:fillRef idx="1">
+            <a:schemeClr val="accent1"/>
+          </a:fillRef>
+          <a:effectRef idx="0">
+            <a:schemeClr val="accent1"/>
+          </a:effectRef>
+          <a:fontRef idx="minor">
+            <a:schemeClr val="lt1"/>
+          </a:fontRef>
+        </p:style>
+        <p:txBody>
+          <a:bodyPr rtlCol="0" anchor="ctr"/>
+          <a:lstStyle/>
+          <a:p>
+            <a:pPr algn="ctr"/>
+            <a:endParaRPr lang="it-IT"/>
+          </a:p>
+        </p:txBody>
+      </p:sp>
+      <p:sp>
+        <p:nvSpPr>
+          <p:cNvPr id="67" name="Rettangolo 66">
+            <a:extLst>
+              <a:ext uri="{FF2B5EF4-FFF2-40B4-BE49-F238E27FC236}">
+                <a16:creationId xmlns:a16="http://schemas.microsoft.com/office/drawing/2014/main" id="{8D8D0C17-A796-7196-5F6C-FE71BE616465}"/>
+              </a:ext>
+            </a:extLst>
+          </p:cNvPr>
+          <p:cNvSpPr/>
+          <p:nvPr/>
+        </p:nvSpPr>
+        <p:spPr>
+          <a:xfrm>
+            <a:off x="8072094" y="1187701"/>
+            <a:ext cx="346710" cy="86466"/>
+          </a:xfrm>
+          <a:prstGeom prst="rect">
+            <a:avLst/>
+          </a:prstGeom>
+          <a:solidFill>
+            <a:srgbClr val="C1C1C1"/>
+          </a:solidFill>
+          <a:ln>
+            <a:noFill/>
+          </a:ln>
+        </p:spPr>
+        <p:style>
+          <a:lnRef idx="2">
+            <a:schemeClr val="accent1">
+              <a:shade val="15000"/>
+            </a:schemeClr>
+          </a:lnRef>
+          <a:fillRef idx="1">
+            <a:schemeClr val="accent1"/>
+          </a:fillRef>
+          <a:effectRef idx="0">
+            <a:schemeClr val="accent1"/>
+          </a:effectRef>
+          <a:fontRef idx="minor">
+            <a:schemeClr val="lt1"/>
+          </a:fontRef>
+        </p:style>
+        <p:txBody>
+          <a:bodyPr rtlCol="0" anchor="ctr"/>
+          <a:lstStyle/>
+          <a:p>
+            <a:pPr algn="ctr"/>
+            <a:endParaRPr lang="it-IT"/>
+          </a:p>
+        </p:txBody>
+      </p:sp>
+      <p:sp>
+        <p:nvSpPr>
+          <p:cNvPr id="68" name="Rettangolo 67">
+            <a:extLst>
+              <a:ext uri="{FF2B5EF4-FFF2-40B4-BE49-F238E27FC236}">
+                <a16:creationId xmlns:a16="http://schemas.microsoft.com/office/drawing/2014/main" id="{A5CB9161-80F3-94AD-295B-CD1A191A5E1B}"/>
+              </a:ext>
+            </a:extLst>
+          </p:cNvPr>
+          <p:cNvSpPr/>
+          <p:nvPr/>
+        </p:nvSpPr>
+        <p:spPr>
+          <a:xfrm>
+            <a:off x="5757900" y="5167578"/>
+            <a:ext cx="346710" cy="86466"/>
+          </a:xfrm>
+          <a:prstGeom prst="rect">
+            <a:avLst/>
+          </a:prstGeom>
+          <a:solidFill>
+            <a:srgbClr val="C1C1C1"/>
+          </a:solidFill>
+          <a:ln>
+            <a:noFill/>
+          </a:ln>
+        </p:spPr>
+        <p:style>
+          <a:lnRef idx="2">
+            <a:schemeClr val="accent1">
+              <a:shade val="15000"/>
+            </a:schemeClr>
+          </a:lnRef>
+          <a:fillRef idx="1">
+            <a:schemeClr val="accent1"/>
+          </a:fillRef>
+          <a:effectRef idx="0">
+            <a:schemeClr val="accent1"/>
+          </a:effectRef>
+          <a:fontRef idx="minor">
+            <a:schemeClr val="lt1"/>
+          </a:fontRef>
+        </p:style>
+        <p:txBody>
+          <a:bodyPr rtlCol="0" anchor="ctr"/>
+          <a:lstStyle/>
+          <a:p>
+            <a:pPr algn="ctr"/>
+            <a:endParaRPr lang="it-IT"/>
+          </a:p>
+        </p:txBody>
+      </p:sp>
+      <p:sp>
+        <p:nvSpPr>
+          <p:cNvPr id="70" name="Rettangolo 69">
+            <a:extLst>
+              <a:ext uri="{FF2B5EF4-FFF2-40B4-BE49-F238E27FC236}">
+                <a16:creationId xmlns:a16="http://schemas.microsoft.com/office/drawing/2014/main" id="{5CAFC7D2-D141-A0A7-57E0-9EA315E632F1}"/>
+              </a:ext>
+            </a:extLst>
+          </p:cNvPr>
+          <p:cNvSpPr/>
+          <p:nvPr/>
+        </p:nvSpPr>
+        <p:spPr>
+          <a:xfrm>
+            <a:off x="8797053" y="5159958"/>
+            <a:ext cx="346710" cy="86466"/>
+          </a:xfrm>
+          <a:prstGeom prst="rect">
+            <a:avLst/>
+          </a:prstGeom>
+          <a:solidFill>
+            <a:srgbClr val="C1C1C1"/>
+          </a:solidFill>
+          <a:ln>
+            <a:noFill/>
+          </a:ln>
+        </p:spPr>
+        <p:style>
+          <a:lnRef idx="2">
+            <a:schemeClr val="accent1">
+              <a:shade val="15000"/>
+            </a:schemeClr>
+          </a:lnRef>
+          <a:fillRef idx="1">
+            <a:schemeClr val="accent1"/>
+          </a:fillRef>
+          <a:effectRef idx="0">
+            <a:schemeClr val="accent1"/>
+          </a:effectRef>
+          <a:fontRef idx="minor">
+            <a:schemeClr val="lt1"/>
+          </a:fontRef>
+        </p:style>
+        <p:txBody>
+          <a:bodyPr rtlCol="0" anchor="ctr"/>
+          <a:lstStyle/>
+          <a:p>
+            <a:pPr algn="ctr"/>
+            <a:endParaRPr lang="it-IT"/>
+          </a:p>
+        </p:txBody>
+      </p:sp>
+    </p:spTree>
+    <p:extLst>
+      <p:ext uri="{BB962C8B-B14F-4D97-AF65-F5344CB8AC3E}">
+        <p14:creationId xmlns:p14="http://schemas.microsoft.com/office/powerpoint/2010/main" val="1474830064"/>
       </p:ext>
     </p:extLst>
   </p:cSld>

</xml_diff>